<commit_message>
Change TD4 RPBN & Anglais
</commit_message>
<xml_diff>
--- a/Semestre 2/Anglais/Anglais Entreprise/Examen - 1/DOSSIER PREP/Mark ZUCKERBERG.pptx
+++ b/Semestre 2/Anglais/Anglais Entreprise/Examen - 1/DOSSIER PREP/Mark ZUCKERBERG.pptx
@@ -14,8 +14,8 @@
     <p:sldId id="259" r:id="rId2"/>
     <p:sldId id="260" r:id="rId3"/>
     <p:sldId id="262" r:id="rId4"/>
-    <p:sldId id="261" r:id="rId5"/>
-    <p:sldId id="263" r:id="rId6"/>
+    <p:sldId id="263" r:id="rId5"/>
+    <p:sldId id="261" r:id="rId6"/>
     <p:sldId id="267" r:id="rId7"/>
     <p:sldId id="264" r:id="rId8"/>
     <p:sldId id="265" r:id="rId9"/>
@@ -213,7 +213,7 @@
             <a:pPr rtl="0"/>
             <a:fld id="{DEE369ED-7387-4991-ACC3-462A09193407}" type="datetime1">
               <a:rPr lang="fr-FR" smtClean="0"/>
-              <a:t>12/03/2022</a:t>
+              <a:t>14/03/2022</a:t>
             </a:fld>
             <a:endParaRPr lang="en-US" dirty="0"/>
           </a:p>
@@ -383,7 +383,7 @@
             <a:pPr rtl="0"/>
             <a:fld id="{68FE2DEA-50D1-4FBC-833B-64DE3548015C}" type="datetime1">
               <a:rPr lang="fr-FR" smtClean="0"/>
-              <a:t>12/03/2022</a:t>
+              <a:t>14/03/2022</a:t>
             </a:fld>
             <a:endParaRPr lang="en-US"/>
           </a:p>
@@ -844,7 +844,7 @@
             <a:pPr rtl="0"/>
             <a:fld id="{EC765520-6E07-4474-B65D-80EFEC7E1B73}" type="datetime1">
               <a:rPr lang="fr-FR" smtClean="0"/>
-              <a:t>12/03/2022</a:t>
+              <a:t>14/03/2022</a:t>
             </a:fld>
             <a:endParaRPr lang="en-US" dirty="0"/>
           </a:p>
@@ -1154,7 +1154,7 @@
             <a:pPr rtl="0"/>
             <a:fld id="{C4A547DE-0BAD-4ACE-8E73-676DE4F43F23}" type="datetime1">
               <a:rPr lang="fr-FR" smtClean="0"/>
-              <a:t>12/03/2022</a:t>
+              <a:t>14/03/2022</a:t>
             </a:fld>
             <a:endParaRPr lang="en-US" dirty="0"/>
           </a:p>
@@ -1352,7 +1352,7 @@
             <a:pPr rtl="0"/>
             <a:fld id="{8B643C94-4C15-4991-988E-CC4F6021FC7C}" type="datetime1">
               <a:rPr lang="fr-FR" smtClean="0"/>
-              <a:t>12/03/2022</a:t>
+              <a:t>14/03/2022</a:t>
             </a:fld>
             <a:endParaRPr lang="en-US" dirty="0"/>
           </a:p>
@@ -1619,7 +1619,7 @@
             <a:pPr rtl="0"/>
             <a:fld id="{63F2280F-B983-48D5-A990-D6F2506DE6D5}" type="datetime1">
               <a:rPr lang="fr-FR" smtClean="0"/>
-              <a:t>12/03/2022</a:t>
+              <a:t>14/03/2022</a:t>
             </a:fld>
             <a:endParaRPr lang="en-US" dirty="0"/>
           </a:p>
@@ -2059,7 +2059,7 @@
             <a:pPr rtl="0"/>
             <a:fld id="{176529EE-CB6A-49B8-8C34-F107491C4B66}" type="datetime1">
               <a:rPr lang="fr-FR" smtClean="0"/>
-              <a:t>12/03/2022</a:t>
+              <a:t>14/03/2022</a:t>
             </a:fld>
             <a:endParaRPr lang="en-US" dirty="0"/>
           </a:p>
@@ -2600,7 +2600,7 @@
             <a:pPr rtl="0"/>
             <a:fld id="{2E4D0FE2-C27F-4847-8837-780863AA8A72}" type="datetime1">
               <a:rPr lang="fr-FR" smtClean="0"/>
-              <a:t>12/03/2022</a:t>
+              <a:t>14/03/2022</a:t>
             </a:fld>
             <a:endParaRPr lang="en-US" dirty="0"/>
           </a:p>
@@ -3489,7 +3489,7 @@
             <a:pPr rtl="0"/>
             <a:fld id="{43C1E9D0-1A91-439A-8299-279A09FBF35E}" type="datetime1">
               <a:rPr lang="fr-FR" smtClean="0"/>
-              <a:t>12/03/2022</a:t>
+              <a:t>14/03/2022</a:t>
             </a:fld>
             <a:endParaRPr lang="en-US" dirty="0"/>
           </a:p>
@@ -3663,7 +3663,7 @@
             <a:pPr rtl="0"/>
             <a:fld id="{CD2C11BE-43AE-4864-8C21-E0CB621AF2ED}" type="datetime1">
               <a:rPr lang="fr-FR" smtClean="0"/>
-              <a:t>12/03/2022</a:t>
+              <a:t>14/03/2022</a:t>
             </a:fld>
             <a:endParaRPr lang="en-US" dirty="0"/>
           </a:p>
@@ -3851,7 +3851,7 @@
             <a:pPr rtl="0"/>
             <a:fld id="{737C20FF-A183-44CD-820E-C528520B0905}" type="datetime1">
               <a:rPr lang="fr-FR" smtClean="0"/>
-              <a:t>12/03/2022</a:t>
+              <a:t>14/03/2022</a:t>
             </a:fld>
             <a:endParaRPr lang="en-US" dirty="0"/>
           </a:p>
@@ -4025,7 +4025,7 @@
             <a:pPr rtl="0"/>
             <a:fld id="{FD094AD0-F424-4FFB-98B8-BDBD0ED0D09C}" type="datetime1">
               <a:rPr lang="fr-FR" smtClean="0"/>
-              <a:t>12/03/2022</a:t>
+              <a:t>14/03/2022</a:t>
             </a:fld>
             <a:endParaRPr lang="en-US" dirty="0"/>
           </a:p>
@@ -4273,7 +4273,7 @@
             <a:pPr rtl="0"/>
             <a:fld id="{6C905468-72BC-4E6B-87DB-9FC7B6201883}" type="datetime1">
               <a:rPr lang="fr-FR" smtClean="0"/>
-              <a:t>12/03/2022</a:t>
+              <a:t>14/03/2022</a:t>
             </a:fld>
             <a:endParaRPr lang="en-US" dirty="0"/>
           </a:p>
@@ -4527,7 +4527,7 @@
             <a:pPr rtl="0"/>
             <a:fld id="{23EA7AC6-29D6-4E4A-9E2D-506FA450F669}" type="datetime1">
               <a:rPr lang="fr-FR" smtClean="0"/>
-              <a:t>12/03/2022</a:t>
+              <a:t>14/03/2022</a:t>
             </a:fld>
             <a:endParaRPr lang="en-US" dirty="0"/>
           </a:p>
@@ -5014,7 +5014,7 @@
             <a:pPr rtl="0"/>
             <a:fld id="{F10C01C1-A8A9-41B1-8349-D57B9704EBF0}" type="datetime1">
               <a:rPr lang="fr-FR" smtClean="0"/>
-              <a:t>12/03/2022</a:t>
+              <a:t>14/03/2022</a:t>
             </a:fld>
             <a:endParaRPr lang="en-US" dirty="0"/>
           </a:p>
@@ -5136,7 +5136,7 @@
             <a:pPr rtl="0"/>
             <a:fld id="{02C28B88-1705-406F-816B-66525F70D2FF}" type="datetime1">
               <a:rPr lang="fr-FR" smtClean="0"/>
-              <a:t>12/03/2022</a:t>
+              <a:t>14/03/2022</a:t>
             </a:fld>
             <a:endParaRPr lang="en-US" dirty="0"/>
           </a:p>
@@ -5234,7 +5234,7 @@
             <a:pPr rtl="0"/>
             <a:fld id="{13BB18EB-0F08-4D52-B1C1-2BBAC704D682}" type="datetime1">
               <a:rPr lang="fr-FR" smtClean="0"/>
-              <a:t>12/03/2022</a:t>
+              <a:t>14/03/2022</a:t>
             </a:fld>
             <a:endParaRPr lang="en-US" dirty="0"/>
           </a:p>
@@ -5493,7 +5493,7 @@
             <a:pPr rtl="0"/>
             <a:fld id="{A1DC856E-E415-49E3-A77A-7948CF583C6E}" type="datetime1">
               <a:rPr lang="fr-FR" smtClean="0"/>
-              <a:t>12/03/2022</a:t>
+              <a:t>14/03/2022</a:t>
             </a:fld>
             <a:endParaRPr lang="en-US" dirty="0"/>
           </a:p>
@@ -5805,7 +5805,7 @@
             <a:pPr rtl="0"/>
             <a:fld id="{7CD2BD9D-9B72-48E5-8E98-62EA1FDA6E9A}" type="datetime1">
               <a:rPr lang="fr-FR" smtClean="0"/>
-              <a:t>12/03/2022</a:t>
+              <a:t>14/03/2022</a:t>
             </a:fld>
             <a:endParaRPr lang="en-US" dirty="0"/>
           </a:p>
@@ -6043,7 +6043,7 @@
             <a:pPr rtl="0"/>
             <a:fld id="{A7EF5840-517F-44F4-876E-57CDFE3D6418}" type="datetime1">
               <a:rPr lang="fr-FR" smtClean="0"/>
-              <a:t>12/03/2022</a:t>
+              <a:t>14/03/2022</a:t>
             </a:fld>
             <a:endParaRPr lang="en-US" dirty="0"/>
           </a:p>
@@ -7496,7 +7496,7 @@
             </a:r>
             <a:r>
               <a:rPr lang="fr-FR" dirty="0"/>
-              <a:t>: </a:t>
+              <a:t> </a:t>
             </a:r>
             <a:r>
               <a:rPr lang="fr-FR" b="1" dirty="0" err="1"/>
@@ -8128,50 +8128,12 @@
           <a:chExt cx="0" cy="0"/>
         </a:xfrm>
       </p:grpSpPr>
-      <p:cxnSp>
-        <p:nvCxnSpPr>
-          <p:cNvPr id="6" name="Connecteur droit 5">
+      <p:sp>
+        <p:nvSpPr>
+          <p:cNvPr id="5" name="Titre 4">
             <a:extLst>
               <a:ext uri="{FF2B5EF4-FFF2-40B4-BE49-F238E27FC236}">
-                <a16:creationId xmlns:a16="http://schemas.microsoft.com/office/drawing/2014/main" id="{869AD87B-91B4-40AC-B8E7-AB8889313368}"/>
-              </a:ext>
-            </a:extLst>
-          </p:cNvPr>
-          <p:cNvCxnSpPr>
-            <a:cxnSpLocks/>
-          </p:cNvCxnSpPr>
-          <p:nvPr/>
-        </p:nvCxnSpPr>
-        <p:spPr>
-          <a:xfrm flipH="1">
-            <a:off x="9098280" y="762635"/>
-            <a:ext cx="3093720" cy="0"/>
-          </a:xfrm>
-          <a:prstGeom prst="line">
-            <a:avLst/>
-          </a:prstGeom>
-        </p:spPr>
-        <p:style>
-          <a:lnRef idx="3">
-            <a:schemeClr val="accent1"/>
-          </a:lnRef>
-          <a:fillRef idx="0">
-            <a:schemeClr val="accent1"/>
-          </a:fillRef>
-          <a:effectRef idx="2">
-            <a:schemeClr val="accent1"/>
-          </a:effectRef>
-          <a:fontRef idx="minor">
-            <a:schemeClr val="tx1"/>
-          </a:fontRef>
-        </p:style>
-      </p:cxnSp>
-      <p:sp>
-        <p:nvSpPr>
-          <p:cNvPr id="3" name="Titre 2">
-            <a:extLst>
-              <a:ext uri="{FF2B5EF4-FFF2-40B4-BE49-F238E27FC236}">
-                <a16:creationId xmlns:a16="http://schemas.microsoft.com/office/drawing/2014/main" id="{27D3A3D3-E048-42C9-9500-8AFCCF731632}"/>
+                <a16:creationId xmlns:a16="http://schemas.microsoft.com/office/drawing/2014/main" id="{25ADF437-007F-40BE-BADC-D685F715079A}"/>
               </a:ext>
             </a:extLst>
           </p:cNvPr>
@@ -8179,34 +8141,27 @@
             <a:spLocks noGrp="1"/>
           </p:cNvSpPr>
           <p:nvPr>
-            <p:ph type="title"/>
+            <p:ph type="ctrTitle"/>
           </p:nvPr>
         </p:nvSpPr>
-        <p:spPr>
-          <a:xfrm>
-            <a:off x="9225164" y="144780"/>
-            <a:ext cx="2984616" cy="822960"/>
-          </a:xfrm>
-        </p:spPr>
-        <p:txBody>
-          <a:bodyPr>
-            <a:normAutofit fontScale="90000"/>
-          </a:bodyPr>
+        <p:spPr/>
+        <p:txBody>
+          <a:bodyPr/>
           <a:lstStyle/>
           <a:p>
             <a:r>
-              <a:rPr lang="en-US" b="1" dirty="0"/>
-              <a:t>Bibliography</a:t>
-            </a:r>
-          </a:p>
-        </p:txBody>
-      </p:sp>
-      <p:sp>
-        <p:nvSpPr>
-          <p:cNvPr id="4" name="Espace réservé du contenu 3">
+              <a:rPr lang="en-US" dirty="0"/>
+              <a:t>Thank you for listening</a:t>
+            </a:r>
+          </a:p>
+        </p:txBody>
+      </p:sp>
+      <p:sp>
+        <p:nvSpPr>
+          <p:cNvPr id="6" name="Sous-titre 5">
             <a:extLst>
               <a:ext uri="{FF2B5EF4-FFF2-40B4-BE49-F238E27FC236}">
-                <a16:creationId xmlns:a16="http://schemas.microsoft.com/office/drawing/2014/main" id="{233A7084-1C18-4353-9959-346D29136BD3}"/>
+                <a16:creationId xmlns:a16="http://schemas.microsoft.com/office/drawing/2014/main" id="{9D6DEBEF-C9DD-4A14-991D-6EBEA17F01AD}"/>
               </a:ext>
             </a:extLst>
           </p:cNvPr>
@@ -8214,133 +8169,33 @@
             <a:spLocks noGrp="1"/>
           </p:cNvSpPr>
           <p:nvPr>
-            <p:ph idx="1"/>
+            <p:ph type="subTitle" idx="1"/>
           </p:nvPr>
         </p:nvSpPr>
-        <p:spPr>
-          <a:xfrm>
-            <a:off x="121804" y="1380491"/>
-            <a:ext cx="11374871" cy="3714749"/>
-          </a:xfrm>
-        </p:spPr>
+        <p:spPr/>
         <p:txBody>
           <a:bodyPr/>
           <a:lstStyle/>
           <a:p>
-            <a:pPr algn="just">
-              <a:lnSpc>
-                <a:spcPct val="107000"/>
-              </a:lnSpc>
-            </a:pPr>
-            <a:r>
-              <a:rPr lang="fr-FR" i="1" dirty="0"/>
-              <a:t>Wikipédia: </a:t>
-            </a:r>
-            <a:r>
-              <a:rPr lang="fr-FR" sz="1800" i="1" u="sng" dirty="0">
-                <a:solidFill>
-                  <a:srgbClr val="0563C1"/>
-                </a:solidFill>
-                <a:effectLst/>
-                <a:latin typeface="Calibri" panose="020F0502020204030204" pitchFamily="34" charset="0"/>
-                <a:ea typeface="Calibri" panose="020F0502020204030204" pitchFamily="34" charset="0"/>
-                <a:cs typeface="Arial" panose="020B0604020202020204" pitchFamily="34" charset="0"/>
-                <a:hlinkClick r:id="rId2"/>
-              </a:rPr>
-              <a:t>https://en.wikipedia.org/wiki/Mark_Zuckerberg</a:t>
-            </a:r>
-            <a:endParaRPr lang="fr-FR" sz="1800" i="1" dirty="0">
-              <a:effectLst/>
-              <a:latin typeface="Calibri" panose="020F0502020204030204" pitchFamily="34" charset="0"/>
-              <a:ea typeface="Calibri" panose="020F0502020204030204" pitchFamily="34" charset="0"/>
-              <a:cs typeface="Arial" panose="020B0604020202020204" pitchFamily="34" charset="0"/>
-            </a:endParaRPr>
-          </a:p>
-          <a:p>
-            <a:pPr algn="just">
-              <a:lnSpc>
-                <a:spcPct val="107000"/>
-              </a:lnSpc>
-            </a:pPr>
-            <a:r>
-              <a:rPr lang="fr-FR" i="1" dirty="0"/>
-              <a:t>L’internaute: </a:t>
-            </a:r>
-            <a:r>
-              <a:rPr lang="fr-FR" sz="1800" i="1" u="sng" dirty="0">
-                <a:solidFill>
-                  <a:srgbClr val="0563C1"/>
-                </a:solidFill>
-                <a:effectLst/>
-                <a:latin typeface="Calibri" panose="020F0502020204030204" pitchFamily="34" charset="0"/>
-                <a:ea typeface="Calibri" panose="020F0502020204030204" pitchFamily="34" charset="0"/>
-                <a:cs typeface="Arial" panose="020B0604020202020204" pitchFamily="34" charset="0"/>
-                <a:hlinkClick r:id="rId3"/>
-              </a:rPr>
-              <a:t>https://www.linternaute.fr/actualite/biographie/1776230-mark-zuckerberg-biographie-courte-dates-citations/</a:t>
-            </a:r>
-            <a:endParaRPr lang="fr-FR" i="1" dirty="0"/>
-          </a:p>
-          <a:p>
-            <a:pPr algn="just">
-              <a:lnSpc>
-                <a:spcPct val="107000"/>
-              </a:lnSpc>
-            </a:pPr>
-            <a:r>
-              <a:rPr lang="fr-FR" sz="1800" i="1" dirty="0">
-                <a:effectLst/>
-                <a:latin typeface="Calibri" panose="020F0502020204030204" pitchFamily="34" charset="0"/>
-                <a:ea typeface="Calibri" panose="020F0502020204030204" pitchFamily="34" charset="0"/>
-                <a:cs typeface="Arial" panose="020B0604020202020204" pitchFamily="34" charset="0"/>
-              </a:rPr>
-              <a:t>Futura Sciences: </a:t>
-            </a:r>
-            <a:r>
-              <a:rPr lang="fr-FR" sz="1800" i="1" dirty="0">
-                <a:latin typeface="Calibri" panose="020F0502020204030204" pitchFamily="34" charset="0"/>
-                <a:cs typeface="Calibri" panose="020F0502020204030204" pitchFamily="34" charset="0"/>
-                <a:hlinkClick r:id="rId4"/>
-              </a:rPr>
-              <a:t>Biographie | Mark Zuckerberg - Fondateur &amp; P.-D.G | Futura Tech (futura-sciences.com)</a:t>
-            </a:r>
-            <a:endParaRPr lang="fr-FR" sz="1800" i="1" dirty="0">
-              <a:effectLst/>
-              <a:latin typeface="Calibri" panose="020F0502020204030204" pitchFamily="34" charset="0"/>
-              <a:ea typeface="Calibri" panose="020F0502020204030204" pitchFamily="34" charset="0"/>
-              <a:cs typeface="Calibri" panose="020F0502020204030204" pitchFamily="34" charset="0"/>
-            </a:endParaRPr>
-          </a:p>
-          <a:p>
-            <a:pPr algn="just">
-              <a:lnSpc>
-                <a:spcPct val="107000"/>
-              </a:lnSpc>
-            </a:pPr>
-            <a:r>
-              <a:rPr lang="fr-FR" sz="1800" i="1" dirty="0">
-                <a:effectLst/>
-                <a:latin typeface="Calibri" panose="020F0502020204030204" pitchFamily="34" charset="0"/>
-                <a:ea typeface="Calibri" panose="020F0502020204030204" pitchFamily="34" charset="0"/>
-                <a:cs typeface="Arial" panose="020B0604020202020204" pitchFamily="34" charset="0"/>
-              </a:rPr>
-              <a:t>s</a:t>
-            </a:r>
-          </a:p>
-          <a:p>
-            <a:pPr algn="just">
-              <a:lnSpc>
-                <a:spcPct val="107000"/>
-              </a:lnSpc>
-            </a:pPr>
-            <a:endParaRPr lang="fr-FR" i="1" dirty="0"/>
+            <a:r>
+              <a:rPr lang="en-US" dirty="0"/>
+              <a:t>If you have question … </a:t>
+            </a:r>
+            <a:r>
+              <a:rPr lang="en-US" dirty="0" err="1"/>
+              <a:t>I’am</a:t>
+            </a:r>
+            <a:r>
+              <a:rPr lang="en-US" dirty="0"/>
+              <a:t> here !</a:t>
+            </a:r>
           </a:p>
         </p:txBody>
       </p:sp>
     </p:spTree>
     <p:extLst>
       <p:ext uri="{BB962C8B-B14F-4D97-AF65-F5344CB8AC3E}">
-        <p14:creationId xmlns:p14="http://schemas.microsoft.com/office/powerpoint/2010/main" val="1712919911"/>
+        <p14:creationId xmlns:p14="http://schemas.microsoft.com/office/powerpoint/2010/main" val="3370251953"/>
       </p:ext>
     </p:extLst>
   </p:cSld>
@@ -8367,12 +8222,50 @@
           <a:chExt cx="0" cy="0"/>
         </a:xfrm>
       </p:grpSpPr>
-      <p:sp>
-        <p:nvSpPr>
-          <p:cNvPr id="5" name="Titre 4">
+      <p:cxnSp>
+        <p:nvCxnSpPr>
+          <p:cNvPr id="6" name="Connecteur droit 5">
             <a:extLst>
               <a:ext uri="{FF2B5EF4-FFF2-40B4-BE49-F238E27FC236}">
-                <a16:creationId xmlns:a16="http://schemas.microsoft.com/office/drawing/2014/main" id="{25ADF437-007F-40BE-BADC-D685F715079A}"/>
+                <a16:creationId xmlns:a16="http://schemas.microsoft.com/office/drawing/2014/main" id="{869AD87B-91B4-40AC-B8E7-AB8889313368}"/>
+              </a:ext>
+            </a:extLst>
+          </p:cNvPr>
+          <p:cNvCxnSpPr>
+            <a:cxnSpLocks/>
+          </p:cNvCxnSpPr>
+          <p:nvPr/>
+        </p:nvCxnSpPr>
+        <p:spPr>
+          <a:xfrm flipH="1">
+            <a:off x="9098280" y="762635"/>
+            <a:ext cx="3093720" cy="0"/>
+          </a:xfrm>
+          <a:prstGeom prst="line">
+            <a:avLst/>
+          </a:prstGeom>
+        </p:spPr>
+        <p:style>
+          <a:lnRef idx="3">
+            <a:schemeClr val="accent1"/>
+          </a:lnRef>
+          <a:fillRef idx="0">
+            <a:schemeClr val="accent1"/>
+          </a:fillRef>
+          <a:effectRef idx="2">
+            <a:schemeClr val="accent1"/>
+          </a:effectRef>
+          <a:fontRef idx="minor">
+            <a:schemeClr val="tx1"/>
+          </a:fontRef>
+        </p:style>
+      </p:cxnSp>
+      <p:sp>
+        <p:nvSpPr>
+          <p:cNvPr id="3" name="Titre 2">
+            <a:extLst>
+              <a:ext uri="{FF2B5EF4-FFF2-40B4-BE49-F238E27FC236}">
+                <a16:creationId xmlns:a16="http://schemas.microsoft.com/office/drawing/2014/main" id="{27D3A3D3-E048-42C9-9500-8AFCCF731632}"/>
               </a:ext>
             </a:extLst>
           </p:cNvPr>
@@ -8380,44 +8273,34 @@
             <a:spLocks noGrp="1"/>
           </p:cNvSpPr>
           <p:nvPr>
-            <p:ph type="ctrTitle"/>
+            <p:ph type="title"/>
           </p:nvPr>
         </p:nvSpPr>
-        <p:spPr/>
-        <p:txBody>
-          <a:bodyPr/>
+        <p:spPr>
+          <a:xfrm>
+            <a:off x="9225164" y="144780"/>
+            <a:ext cx="2984616" cy="822960"/>
+          </a:xfrm>
+        </p:spPr>
+        <p:txBody>
+          <a:bodyPr>
+            <a:normAutofit fontScale="90000"/>
+          </a:bodyPr>
           <a:lstStyle/>
           <a:p>
             <a:r>
-              <a:rPr lang="fr-FR" dirty="0" err="1"/>
-              <a:t>Thank</a:t>
-            </a:r>
-            <a:r>
-              <a:rPr lang="fr-FR" dirty="0"/>
-              <a:t> </a:t>
-            </a:r>
-            <a:r>
-              <a:rPr lang="fr-FR" dirty="0" err="1"/>
-              <a:t>you</a:t>
-            </a:r>
-            <a:r>
-              <a:rPr lang="fr-FR" dirty="0"/>
-              <a:t> for </a:t>
-            </a:r>
-            <a:r>
-              <a:rPr lang="fr-FR" dirty="0" err="1"/>
-              <a:t>listening</a:t>
-            </a:r>
-            <a:endParaRPr lang="fr-FR" dirty="0"/>
-          </a:p>
-        </p:txBody>
-      </p:sp>
-      <p:sp>
-        <p:nvSpPr>
-          <p:cNvPr id="6" name="Sous-titre 5">
+              <a:rPr lang="en-US" b="1" dirty="0"/>
+              <a:t>Bibliography</a:t>
+            </a:r>
+          </a:p>
+        </p:txBody>
+      </p:sp>
+      <p:sp>
+        <p:nvSpPr>
+          <p:cNvPr id="4" name="Espace réservé du contenu 3">
             <a:extLst>
               <a:ext uri="{FF2B5EF4-FFF2-40B4-BE49-F238E27FC236}">
-                <a16:creationId xmlns:a16="http://schemas.microsoft.com/office/drawing/2014/main" id="{9D6DEBEF-C9DD-4A14-991D-6EBEA17F01AD}"/>
+                <a16:creationId xmlns:a16="http://schemas.microsoft.com/office/drawing/2014/main" id="{233A7084-1C18-4353-9959-346D29136BD3}"/>
               </a:ext>
             </a:extLst>
           </p:cNvPr>
@@ -8425,22 +8308,90 @@
             <a:spLocks noGrp="1"/>
           </p:cNvSpPr>
           <p:nvPr>
-            <p:ph type="subTitle" idx="1"/>
+            <p:ph idx="1"/>
           </p:nvPr>
         </p:nvSpPr>
-        <p:spPr/>
-        <p:txBody>
-          <a:bodyPr/>
+        <p:spPr>
+          <a:xfrm>
+            <a:off x="121804" y="1380491"/>
+            <a:ext cx="11374871" cy="3714749"/>
+          </a:xfrm>
+        </p:spPr>
+        <p:txBody>
+          <a:bodyPr>
+            <a:normAutofit/>
+          </a:bodyPr>
           <a:lstStyle/>
           <a:p>
-            <a:endParaRPr lang="fr-FR"/>
+            <a:pPr>
+              <a:lnSpc>
+                <a:spcPct val="107000"/>
+              </a:lnSpc>
+            </a:pPr>
+            <a:r>
+              <a:rPr lang="fr-FR" sz="2400" i="1" dirty="0"/>
+              <a:t>L’internaute: </a:t>
+            </a:r>
+            <a:r>
+              <a:rPr lang="fr-FR" sz="2400" i="1" u="sng" dirty="0">
+                <a:solidFill>
+                  <a:srgbClr val="0563C1"/>
+                </a:solidFill>
+                <a:effectLst/>
+                <a:latin typeface="Calibri" panose="020F0502020204030204" pitchFamily="34" charset="0"/>
+                <a:ea typeface="Calibri" panose="020F0502020204030204" pitchFamily="34" charset="0"/>
+                <a:cs typeface="Arial" panose="020B0604020202020204" pitchFamily="34" charset="0"/>
+                <a:hlinkClick r:id="rId2"/>
+              </a:rPr>
+              <a:t>https://www.linternaute.fr/actualite/biographie/1776230-mark-zuckerberg-biographie-courte-dates-citations/</a:t>
+            </a:r>
+            <a:endParaRPr lang="fr-FR" sz="2400" i="1" dirty="0"/>
+          </a:p>
+          <a:p>
+            <a:pPr>
+              <a:lnSpc>
+                <a:spcPct val="107000"/>
+              </a:lnSpc>
+            </a:pPr>
+            <a:r>
+              <a:rPr lang="fr-FR" sz="2400" i="1" dirty="0">
+                <a:effectLst/>
+                <a:ea typeface="Calibri" panose="020F0502020204030204" pitchFamily="34" charset="0"/>
+                <a:cs typeface="Arial" panose="020B0604020202020204" pitchFamily="34" charset="0"/>
+              </a:rPr>
+              <a:t>Futura Sciences: </a:t>
+            </a:r>
+            <a:r>
+              <a:rPr lang="fr-FR" sz="2400" dirty="0">
+                <a:hlinkClick r:id="rId3"/>
+              </a:rPr>
+              <a:t>https://www.futura-sciences.com/tech/personnalites/facebook-mark-zuckerberg-1684/</a:t>
+            </a:r>
+            <a:endParaRPr lang="fr-FR" sz="2400" dirty="0"/>
+          </a:p>
+          <a:p>
+            <a:pPr>
+              <a:lnSpc>
+                <a:spcPct val="107000"/>
+              </a:lnSpc>
+            </a:pPr>
+            <a:r>
+              <a:rPr lang="fr-FR" sz="2400" i="1" dirty="0"/>
+              <a:t>Wikipédia has been use.</a:t>
+            </a:r>
+            <a:endParaRPr lang="fr-FR" sz="2400" i="1" dirty="0">
+              <a:effectLst/>
+              <a:latin typeface="Calibri" panose="020F0502020204030204" pitchFamily="34" charset="0"/>
+              <a:ea typeface="Calibri" panose="020F0502020204030204" pitchFamily="34" charset="0"/>
+              <a:cs typeface="Arial" panose="020B0604020202020204" pitchFamily="34" charset="0"/>
+            </a:endParaRPr>
           </a:p>
         </p:txBody>
       </p:sp>
     </p:spTree>
     <p:extLst>
       <p:ext uri="{BB962C8B-B14F-4D97-AF65-F5344CB8AC3E}">
-        <p14:creationId xmlns:p14="http://schemas.microsoft.com/office/powerpoint/2010/main" val="3370251953"/>
+        <p14:creationId xmlns:p14="http://schemas.microsoft.com/office/powerpoint/2010/main" val="1712919911"/>
       </p:ext>
     </p:extLst>
   </p:cSld>
@@ -8938,109 +8889,6 @@
               <a:t>He chose the color randomly.</a:t>
             </a:r>
             <a:endParaRPr lang="fr-FR" sz="2400" dirty="0"/>
-          </a:p>
-        </p:txBody>
-      </p:sp>
-      <p:sp>
-        <p:nvSpPr>
-          <p:cNvPr id="18" name="Rectangle 17">
-            <a:extLst>
-              <a:ext uri="{FF2B5EF4-FFF2-40B4-BE49-F238E27FC236}">
-                <a16:creationId xmlns:a16="http://schemas.microsoft.com/office/drawing/2014/main" id="{D3F822DB-C455-446B-A95E-CF6CD08F1A5F}"/>
-              </a:ext>
-            </a:extLst>
-          </p:cNvPr>
-          <p:cNvSpPr/>
-          <p:nvPr/>
-        </p:nvSpPr>
-        <p:spPr>
-          <a:xfrm>
-            <a:off x="1029438" y="4791647"/>
-            <a:ext cx="206477" cy="206477"/>
-          </a:xfrm>
-          <a:prstGeom prst="rect">
-            <a:avLst/>
-          </a:prstGeom>
-          <a:noFill/>
-          <a:ln>
-            <a:solidFill>
-              <a:schemeClr val="tx1"/>
-            </a:solidFill>
-          </a:ln>
-        </p:spPr>
-        <p:style>
-          <a:lnRef idx="2">
-            <a:schemeClr val="accent1">
-              <a:shade val="50000"/>
-            </a:schemeClr>
-          </a:lnRef>
-          <a:fillRef idx="1">
-            <a:schemeClr val="accent1"/>
-          </a:fillRef>
-          <a:effectRef idx="0">
-            <a:schemeClr val="accent1"/>
-          </a:effectRef>
-          <a:fontRef idx="minor">
-            <a:schemeClr val="lt1"/>
-          </a:fontRef>
-        </p:style>
-        <p:txBody>
-          <a:bodyPr rtlCol="0" anchor="ctr"/>
-          <a:lstStyle/>
-          <a:p>
-            <a:pPr algn="ctr"/>
-            <a:endParaRPr lang="fr-FR"/>
-          </a:p>
-        </p:txBody>
-      </p:sp>
-      <p:sp>
-        <p:nvSpPr>
-          <p:cNvPr id="19" name="ZoneTexte 18">
-            <a:extLst>
-              <a:ext uri="{FF2B5EF4-FFF2-40B4-BE49-F238E27FC236}">
-                <a16:creationId xmlns:a16="http://schemas.microsoft.com/office/drawing/2014/main" id="{CABC40F8-8BA3-4E41-A390-55DD9F80379B}"/>
-              </a:ext>
-            </a:extLst>
-          </p:cNvPr>
-          <p:cNvSpPr txBox="1"/>
-          <p:nvPr/>
-        </p:nvSpPr>
-        <p:spPr>
-          <a:xfrm>
-            <a:off x="1235915" y="4660569"/>
-            <a:ext cx="4469813" cy="461665"/>
-          </a:xfrm>
-          <a:prstGeom prst="rect">
-            <a:avLst/>
-          </a:prstGeom>
-          <a:noFill/>
-        </p:spPr>
-        <p:txBody>
-          <a:bodyPr wrap="none" rtlCol="0">
-            <a:spAutoFit/>
-          </a:bodyPr>
-          <a:lstStyle/>
-          <a:p>
-            <a:r>
-              <a:rPr lang="fr-FR" sz="2400" dirty="0"/>
-              <a:t>He </a:t>
-            </a:r>
-            <a:r>
-              <a:rPr lang="fr-FR" sz="2400" dirty="0" err="1"/>
-              <a:t>give</a:t>
-            </a:r>
-            <a:r>
-              <a:rPr lang="fr-FR" sz="2400" dirty="0"/>
-              <a:t> the </a:t>
-            </a:r>
-            <a:r>
-              <a:rPr lang="fr-FR" sz="2400" dirty="0" err="1"/>
-              <a:t>choice</a:t>
-            </a:r>
-            <a:r>
-              <a:rPr lang="fr-FR" sz="2400" dirty="0"/>
-              <a:t> to the designers.</a:t>
-            </a:r>
           </a:p>
         </p:txBody>
       </p:sp>
@@ -9469,133 +9317,6 @@
           </a:p>
         </p:txBody>
       </p:sp>
-      <p:sp>
-        <p:nvSpPr>
-          <p:cNvPr id="27" name="Rectangle 26">
-            <a:extLst>
-              <a:ext uri="{FF2B5EF4-FFF2-40B4-BE49-F238E27FC236}">
-                <a16:creationId xmlns:a16="http://schemas.microsoft.com/office/drawing/2014/main" id="{55AF433C-DC33-4EB5-B976-34F524A11185}"/>
-              </a:ext>
-            </a:extLst>
-          </p:cNvPr>
-          <p:cNvSpPr/>
-          <p:nvPr/>
-        </p:nvSpPr>
-        <p:spPr>
-          <a:xfrm>
-            <a:off x="1029438" y="4791647"/>
-            <a:ext cx="206477" cy="206477"/>
-          </a:xfrm>
-          <a:prstGeom prst="rect">
-            <a:avLst/>
-          </a:prstGeom>
-          <a:noFill/>
-          <a:ln>
-            <a:solidFill>
-              <a:srgbClr val="C00000"/>
-            </a:solidFill>
-          </a:ln>
-        </p:spPr>
-        <p:style>
-          <a:lnRef idx="2">
-            <a:schemeClr val="accent1">
-              <a:shade val="50000"/>
-            </a:schemeClr>
-          </a:lnRef>
-          <a:fillRef idx="1">
-            <a:schemeClr val="accent1"/>
-          </a:fillRef>
-          <a:effectRef idx="0">
-            <a:schemeClr val="accent1"/>
-          </a:effectRef>
-          <a:fontRef idx="minor">
-            <a:schemeClr val="lt1"/>
-          </a:fontRef>
-        </p:style>
-        <p:txBody>
-          <a:bodyPr rtlCol="0" anchor="ctr"/>
-          <a:lstStyle/>
-          <a:p>
-            <a:pPr algn="ctr"/>
-            <a:endParaRPr lang="fr-FR">
-              <a:solidFill>
-                <a:srgbClr val="C00000"/>
-              </a:solidFill>
-            </a:endParaRPr>
-          </a:p>
-        </p:txBody>
-      </p:sp>
-      <p:sp>
-        <p:nvSpPr>
-          <p:cNvPr id="28" name="ZoneTexte 27">
-            <a:extLst>
-              <a:ext uri="{FF2B5EF4-FFF2-40B4-BE49-F238E27FC236}">
-                <a16:creationId xmlns:a16="http://schemas.microsoft.com/office/drawing/2014/main" id="{2A62BDB0-3780-47F7-BDBF-3305427157EF}"/>
-              </a:ext>
-            </a:extLst>
-          </p:cNvPr>
-          <p:cNvSpPr txBox="1"/>
-          <p:nvPr/>
-        </p:nvSpPr>
-        <p:spPr>
-          <a:xfrm>
-            <a:off x="1235915" y="4660569"/>
-            <a:ext cx="4469813" cy="461665"/>
-          </a:xfrm>
-          <a:prstGeom prst="rect">
-            <a:avLst/>
-          </a:prstGeom>
-          <a:noFill/>
-        </p:spPr>
-        <p:txBody>
-          <a:bodyPr wrap="none" rtlCol="0">
-            <a:spAutoFit/>
-          </a:bodyPr>
-          <a:lstStyle/>
-          <a:p>
-            <a:r>
-              <a:rPr lang="fr-FR" sz="2400" dirty="0">
-                <a:solidFill>
-                  <a:srgbClr val="C00000"/>
-                </a:solidFill>
-              </a:rPr>
-              <a:t>He </a:t>
-            </a:r>
-            <a:r>
-              <a:rPr lang="fr-FR" sz="2400" dirty="0" err="1">
-                <a:solidFill>
-                  <a:srgbClr val="C00000"/>
-                </a:solidFill>
-              </a:rPr>
-              <a:t>give</a:t>
-            </a:r>
-            <a:r>
-              <a:rPr lang="fr-FR" sz="2400" dirty="0">
-                <a:solidFill>
-                  <a:srgbClr val="C00000"/>
-                </a:solidFill>
-              </a:rPr>
-              <a:t> the </a:t>
-            </a:r>
-            <a:r>
-              <a:rPr lang="fr-FR" sz="2400" dirty="0" err="1">
-                <a:solidFill>
-                  <a:srgbClr val="C00000"/>
-                </a:solidFill>
-              </a:rPr>
-              <a:t>choice</a:t>
-            </a:r>
-            <a:r>
-              <a:rPr lang="fr-FR" sz="2400" dirty="0">
-                <a:solidFill>
-                  <a:srgbClr val="C00000"/>
-                </a:solidFill>
-              </a:rPr>
-              <a:t> to the designers.</a:t>
-            </a:r>
-          </a:p>
-        </p:txBody>
-      </p:sp>
       <p:pic>
         <p:nvPicPr>
           <p:cNvPr id="30" name="Image 29">
@@ -9704,42 +9425,6 @@
           </a:prstGeom>
         </p:spPr>
       </p:pic>
-      <p:pic>
-        <p:nvPicPr>
-          <p:cNvPr id="34" name="Image 33">
-            <a:extLst>
-              <a:ext uri="{FF2B5EF4-FFF2-40B4-BE49-F238E27FC236}">
-                <a16:creationId xmlns:a16="http://schemas.microsoft.com/office/drawing/2014/main" id="{81E0F01F-E4CD-4F6B-9E0B-625B085EFC86}"/>
-              </a:ext>
-            </a:extLst>
-          </p:cNvPr>
-          <p:cNvPicPr>
-            <a:picLocks noChangeAspect="1"/>
-          </p:cNvPicPr>
-          <p:nvPr/>
-        </p:nvPicPr>
-        <p:blipFill>
-          <a:blip r:embed="rId3">
-            <a:extLst>
-              <a:ext uri="{28A0092B-C50C-407E-A947-70E740481C1C}">
-                <a14:useLocalDpi xmlns:a14="http://schemas.microsoft.com/office/drawing/2010/main" val="0"/>
-              </a:ext>
-            </a:extLst>
-          </a:blip>
-          <a:stretch>
-            <a:fillRect/>
-          </a:stretch>
-        </p:blipFill>
-        <p:spPr>
-          <a:xfrm>
-            <a:off x="1029437" y="4796277"/>
-            <a:ext cx="206477" cy="206477"/>
-          </a:xfrm>
-          <a:prstGeom prst="rect">
-            <a:avLst/>
-          </a:prstGeom>
-        </p:spPr>
-      </p:pic>
     </p:spTree>
     <p:extLst>
       <p:ext uri="{BB962C8B-B14F-4D97-AF65-F5344CB8AC3E}">
@@ -9762,6 +9447,9 @@
                     <p:cTn id="3" fill="hold">
                       <p:stCondLst>
                         <p:cond delay="indefinite"/>
+                        <p:cond evt="onBegin" delay="0">
+                          <p:tn val="2"/>
+                        </p:cond>
                       </p:stCondLst>
                       <p:childTnLst>
                         <p:par>
@@ -9771,7 +9459,7 @@
                             </p:stCondLst>
                             <p:childTnLst>
                               <p:par>
-                                <p:cTn id="5" presetID="1" presetClass="entr" presetSubtype="0" fill="hold" grpId="0" nodeType="clickEffect">
+                                <p:cTn id="5" presetID="1" presetClass="entr" presetSubtype="0" fill="hold" grpId="0" nodeType="withEffect">
                                   <p:stCondLst>
                                     <p:cond delay="0"/>
                                   </p:stCondLst>
@@ -9784,7 +9472,7 @@
                                           </p:stCondLst>
                                         </p:cTn>
                                         <p:tgtEl>
-                                          <p:spTgt spid="28"/>
+                                          <p:spTgt spid="25"/>
                                         </p:tgtEl>
                                         <p:attrNameLst>
                                           <p:attrName>style.visibility</p:attrName>
@@ -9811,7 +9499,7 @@
                                           </p:stCondLst>
                                         </p:cTn>
                                         <p:tgtEl>
-                                          <p:spTgt spid="27"/>
+                                          <p:spTgt spid="26"/>
                                         </p:tgtEl>
                                         <p:attrNameLst>
                                           <p:attrName>style.visibility</p:attrName>
@@ -9838,7 +9526,7 @@
                                           </p:stCondLst>
                                         </p:cTn>
                                         <p:tgtEl>
-                                          <p:spTgt spid="25"/>
+                                          <p:spTgt spid="23"/>
                                         </p:tgtEl>
                                         <p:attrNameLst>
                                           <p:attrName>style.visibility</p:attrName>
@@ -9865,7 +9553,7 @@
                                           </p:stCondLst>
                                         </p:cTn>
                                         <p:tgtEl>
-                                          <p:spTgt spid="26"/>
+                                          <p:spTgt spid="24"/>
                                         </p:tgtEl>
                                         <p:attrNameLst>
                                           <p:attrName>style.visibility</p:attrName>
@@ -9892,7 +9580,7 @@
                                           </p:stCondLst>
                                         </p:cTn>
                                         <p:tgtEl>
-                                          <p:spTgt spid="23"/>
+                                          <p:spTgt spid="22"/>
                                         </p:tgtEl>
                                         <p:attrNameLst>
                                           <p:attrName>style.visibility</p:attrName>
@@ -9919,7 +9607,7 @@
                                           </p:stCondLst>
                                         </p:cTn>
                                         <p:tgtEl>
-                                          <p:spTgt spid="24"/>
+                                          <p:spTgt spid="21"/>
                                         </p:tgtEl>
                                         <p:attrNameLst>
                                           <p:attrName>style.visibility</p:attrName>
@@ -9933,7 +9621,7 @@
                                 </p:cTn>
                               </p:par>
                               <p:par>
-                                <p:cTn id="17" presetID="1" presetClass="entr" presetSubtype="0" fill="hold" grpId="0" nodeType="withEffect">
+                                <p:cTn id="17" presetID="1" presetClass="entr" presetSubtype="0" fill="hold" nodeType="withEffect">
                                   <p:stCondLst>
                                     <p:cond delay="0"/>
                                   </p:stCondLst>
@@ -9946,7 +9634,7 @@
                                           </p:stCondLst>
                                         </p:cTn>
                                         <p:tgtEl>
-                                          <p:spTgt spid="22"/>
+                                          <p:spTgt spid="30"/>
                                         </p:tgtEl>
                                         <p:attrNameLst>
                                           <p:attrName>style.visibility</p:attrName>
@@ -9960,7 +9648,7 @@
                                 </p:cTn>
                               </p:par>
                               <p:par>
-                                <p:cTn id="19" presetID="1" presetClass="entr" presetSubtype="0" fill="hold" grpId="0" nodeType="withEffect">
+                                <p:cTn id="19" presetID="1" presetClass="entr" presetSubtype="0" fill="hold" nodeType="withEffect">
                                   <p:stCondLst>
                                     <p:cond delay="0"/>
                                   </p:stCondLst>
@@ -9973,7 +9661,7 @@
                                           </p:stCondLst>
                                         </p:cTn>
                                         <p:tgtEl>
-                                          <p:spTgt spid="21"/>
+                                          <p:spTgt spid="32"/>
                                         </p:tgtEl>
                                         <p:attrNameLst>
                                           <p:attrName>style.visibility</p:attrName>
@@ -10000,88 +9688,7 @@
                                           </p:stCondLst>
                                         </p:cTn>
                                         <p:tgtEl>
-                                          <p:spTgt spid="30"/>
-                                        </p:tgtEl>
-                                        <p:attrNameLst>
-                                          <p:attrName>style.visibility</p:attrName>
-                                        </p:attrNameLst>
-                                      </p:cBhvr>
-                                      <p:to>
-                                        <p:strVal val="visible"/>
-                                      </p:to>
-                                    </p:set>
-                                  </p:childTnLst>
-                                </p:cTn>
-                              </p:par>
-                              <p:par>
-                                <p:cTn id="23" presetID="1" presetClass="entr" presetSubtype="0" fill="hold" nodeType="withEffect">
-                                  <p:stCondLst>
-                                    <p:cond delay="0"/>
-                                  </p:stCondLst>
-                                  <p:childTnLst>
-                                    <p:set>
-                                      <p:cBhvr>
-                                        <p:cTn id="24" dur="1" fill="hold">
-                                          <p:stCondLst>
-                                            <p:cond delay="0"/>
-                                          </p:stCondLst>
-                                        </p:cTn>
-                                        <p:tgtEl>
-                                          <p:spTgt spid="32"/>
-                                        </p:tgtEl>
-                                        <p:attrNameLst>
-                                          <p:attrName>style.visibility</p:attrName>
-                                        </p:attrNameLst>
-                                      </p:cBhvr>
-                                      <p:to>
-                                        <p:strVal val="visible"/>
-                                      </p:to>
-                                    </p:set>
-                                  </p:childTnLst>
-                                </p:cTn>
-                              </p:par>
-                              <p:par>
-                                <p:cTn id="25" presetID="1" presetClass="entr" presetSubtype="0" fill="hold" nodeType="withEffect">
-                                  <p:stCondLst>
-                                    <p:cond delay="0"/>
-                                  </p:stCondLst>
-                                  <p:childTnLst>
-                                    <p:set>
-                                      <p:cBhvr>
-                                        <p:cTn id="26" dur="1" fill="hold">
-                                          <p:stCondLst>
-                                            <p:cond delay="0"/>
-                                          </p:stCondLst>
-                                        </p:cTn>
-                                        <p:tgtEl>
                                           <p:spTgt spid="33"/>
-                                        </p:tgtEl>
-                                        <p:attrNameLst>
-                                          <p:attrName>style.visibility</p:attrName>
-                                        </p:attrNameLst>
-                                      </p:cBhvr>
-                                      <p:to>
-                                        <p:strVal val="visible"/>
-                                      </p:to>
-                                    </p:set>
-                                  </p:childTnLst>
-                                </p:cTn>
-                              </p:par>
-                              <p:par>
-                                <p:cTn id="27" presetID="1" presetClass="entr" presetSubtype="0" fill="hold" nodeType="withEffect">
-                                  <p:stCondLst>
-                                    <p:cond delay="0"/>
-                                  </p:stCondLst>
-                                  <p:childTnLst>
-                                    <p:set>
-                                      <p:cBhvr>
-                                        <p:cTn id="28" dur="1" fill="hold">
-                                          <p:stCondLst>
-                                            <p:cond delay="0"/>
-                                          </p:stCondLst>
-                                        </p:cTn>
-                                        <p:tgtEl>
-                                          <p:spTgt spid="34"/>
                                         </p:tgtEl>
                                         <p:attrNameLst>
                                           <p:attrName>style.visibility</p:attrName>
@@ -10128,8 +9735,6 @@
       <p:bldP spid="24" grpId="0"/>
       <p:bldP spid="25" grpId="0" animBg="1"/>
       <p:bldP spid="26" grpId="0"/>
-      <p:bldP spid="27" grpId="0" animBg="1"/>
-      <p:bldP spid="28" grpId="0"/>
     </p:bldLst>
   </p:timing>
 </p:sld>
@@ -10416,7 +10021,7 @@
         <p:spPr>
           <a:xfrm>
             <a:off x="1235915" y="3078923"/>
-            <a:ext cx="2262414" cy="461665"/>
+            <a:ext cx="1887568" cy="461665"/>
           </a:xfrm>
           <a:prstGeom prst="rect">
             <a:avLst/>
@@ -10430,12 +10035,8 @@
           <a:lstStyle/>
           <a:p>
             <a:r>
-              <a:rPr lang="fr-FR" sz="2400" dirty="0" err="1"/>
-              <a:t>February</a:t>
-            </a:r>
-            <a:r>
               <a:rPr lang="fr-FR" sz="2400" dirty="0"/>
-              <a:t> 4, 2004</a:t>
+              <a:t>May 31, 2004.</a:t>
             </a:r>
           </a:p>
         </p:txBody>
@@ -10507,7 +10108,7 @@
         <p:spPr>
           <a:xfrm>
             <a:off x="1235915" y="3869746"/>
-            <a:ext cx="1886350" cy="461665"/>
+            <a:ext cx="2337756" cy="461665"/>
           </a:xfrm>
           <a:prstGeom prst="rect">
             <a:avLst/>
@@ -10521,101 +10122,18 @@
           <a:lstStyle/>
           <a:p>
             <a:r>
+              <a:rPr lang="fr-FR" sz="2400" dirty="0" err="1"/>
+              <a:t>February</a:t>
+            </a:r>
+            <a:r>
+              <a:rPr lang="fr-FR" sz="2400" dirty="0"/>
+              <a:t> 4, 2004</a:t>
+            </a:r>
+            <a:r>
               <a:rPr lang="en-US" sz="2400" dirty="0"/>
-              <a:t>May 31, 2000.</a:t>
+              <a:t>.</a:t>
             </a:r>
             <a:endParaRPr lang="fr-FR" sz="2400" dirty="0"/>
-          </a:p>
-        </p:txBody>
-      </p:sp>
-      <p:sp>
-        <p:nvSpPr>
-          <p:cNvPr id="18" name="Rectangle 17">
-            <a:extLst>
-              <a:ext uri="{FF2B5EF4-FFF2-40B4-BE49-F238E27FC236}">
-                <a16:creationId xmlns:a16="http://schemas.microsoft.com/office/drawing/2014/main" id="{D3F822DB-C455-446B-A95E-CF6CD08F1A5F}"/>
-              </a:ext>
-            </a:extLst>
-          </p:cNvPr>
-          <p:cNvSpPr/>
-          <p:nvPr/>
-        </p:nvSpPr>
-        <p:spPr>
-          <a:xfrm>
-            <a:off x="1029438" y="4791647"/>
-            <a:ext cx="206477" cy="206477"/>
-          </a:xfrm>
-          <a:prstGeom prst="rect">
-            <a:avLst/>
-          </a:prstGeom>
-          <a:noFill/>
-          <a:ln>
-            <a:solidFill>
-              <a:schemeClr val="tx1"/>
-            </a:solidFill>
-          </a:ln>
-        </p:spPr>
-        <p:style>
-          <a:lnRef idx="2">
-            <a:schemeClr val="accent1">
-              <a:shade val="50000"/>
-            </a:schemeClr>
-          </a:lnRef>
-          <a:fillRef idx="1">
-            <a:schemeClr val="accent1"/>
-          </a:fillRef>
-          <a:effectRef idx="0">
-            <a:schemeClr val="accent1"/>
-          </a:effectRef>
-          <a:fontRef idx="minor">
-            <a:schemeClr val="lt1"/>
-          </a:fontRef>
-        </p:style>
-        <p:txBody>
-          <a:bodyPr rtlCol="0" anchor="ctr"/>
-          <a:lstStyle/>
-          <a:p>
-            <a:pPr algn="ctr"/>
-            <a:endParaRPr lang="fr-FR"/>
-          </a:p>
-        </p:txBody>
-      </p:sp>
-      <p:sp>
-        <p:nvSpPr>
-          <p:cNvPr id="19" name="ZoneTexte 18">
-            <a:extLst>
-              <a:ext uri="{FF2B5EF4-FFF2-40B4-BE49-F238E27FC236}">
-                <a16:creationId xmlns:a16="http://schemas.microsoft.com/office/drawing/2014/main" id="{CABC40F8-8BA3-4E41-A390-55DD9F80379B}"/>
-              </a:ext>
-            </a:extLst>
-          </p:cNvPr>
-          <p:cNvSpPr txBox="1"/>
-          <p:nvPr/>
-        </p:nvSpPr>
-        <p:spPr>
-          <a:xfrm>
-            <a:off x="1235915" y="4660569"/>
-            <a:ext cx="2660921" cy="461665"/>
-          </a:xfrm>
-          <a:prstGeom prst="rect">
-            <a:avLst/>
-          </a:prstGeom>
-          <a:noFill/>
-        </p:spPr>
-        <p:txBody>
-          <a:bodyPr wrap="none" rtlCol="0">
-            <a:spAutoFit/>
-          </a:bodyPr>
-          <a:lstStyle/>
-          <a:p>
-            <a:r>
-              <a:rPr lang="fr-FR" sz="2400" dirty="0" err="1"/>
-              <a:t>December</a:t>
-            </a:r>
-            <a:r>
-              <a:rPr lang="fr-FR" sz="2400" dirty="0"/>
-              <a:t> 25, 2004.</a:t>
-            </a:r>
           </a:p>
         </p:txBody>
       </p:sp>
@@ -10875,7 +10393,7 @@
           <a:noFill/>
           <a:ln>
             <a:solidFill>
-              <a:srgbClr val="00B050"/>
+              <a:srgbClr val="C00000"/>
             </a:solidFill>
           </a:ln>
         </p:spPr>
@@ -10923,7 +10441,7 @@
         <p:spPr>
           <a:xfrm>
             <a:off x="1235915" y="3078923"/>
-            <a:ext cx="2337756" cy="461665"/>
+            <a:ext cx="1812227" cy="461665"/>
           </a:xfrm>
           <a:prstGeom prst="rect">
             <a:avLst/>
@@ -10937,34 +10455,13 @@
           <a:lstStyle/>
           <a:p>
             <a:r>
-              <a:rPr lang="fr-FR" sz="2400" dirty="0" err="1">
+              <a:rPr lang="fr-FR" sz="2400" dirty="0">
                 <a:solidFill>
-                  <a:srgbClr val="00B050"/>
+                  <a:srgbClr val="C00000"/>
                 </a:solidFill>
               </a:rPr>
-              <a:t>February</a:t>
-            </a:r>
-            <a:r>
-              <a:rPr lang="fr-FR" sz="2400" dirty="0">
-                <a:solidFill>
-                  <a:srgbClr val="00B050"/>
-                </a:solidFill>
-              </a:rPr>
-              <a:t> 4, 2004</a:t>
-            </a:r>
-            <a:r>
-              <a:rPr lang="en-US" sz="2400" dirty="0">
-                <a:solidFill>
-                  <a:srgbClr val="00B050"/>
-                </a:solidFill>
-              </a:rPr>
-              <a:t>.</a:t>
-            </a:r>
-            <a:endParaRPr lang="fr-FR" sz="2400" dirty="0">
-              <a:solidFill>
-                <a:srgbClr val="00B050"/>
-              </a:solidFill>
-            </a:endParaRPr>
+              <a:t>May 31, 2004</a:t>
+            </a:r>
           </a:p>
         </p:txBody>
       </p:sp>
@@ -10991,7 +10488,7 @@
           <a:noFill/>
           <a:ln>
             <a:solidFill>
-              <a:srgbClr val="C00000"/>
+              <a:srgbClr val="00B050"/>
             </a:solidFill>
           </a:ln>
         </p:spPr>
@@ -11035,7 +10532,7 @@
         <p:spPr>
           <a:xfrm>
             <a:off x="1235301" y="3869745"/>
-            <a:ext cx="1886350" cy="461665"/>
+            <a:ext cx="2414700" cy="461665"/>
           </a:xfrm>
           <a:prstGeom prst="rect">
             <a:avLst/>
@@ -11049,121 +10546,34 @@
           <a:lstStyle/>
           <a:p>
             <a:r>
+              <a:rPr lang="fr-FR" sz="2400" dirty="0" err="1">
+                <a:solidFill>
+                  <a:srgbClr val="00B050"/>
+                </a:solidFill>
+              </a:rPr>
+              <a:t>February</a:t>
+            </a:r>
+            <a:r>
+              <a:rPr lang="fr-FR" sz="2400" dirty="0">
+                <a:solidFill>
+                  <a:srgbClr val="00B050"/>
+                </a:solidFill>
+              </a:rPr>
+              <a:t> 4, 2004</a:t>
+            </a:r>
+            <a:r>
               <a:rPr lang="en-US" sz="2400" dirty="0">
                 <a:solidFill>
-                  <a:srgbClr val="C00000"/>
+                  <a:srgbClr val="00B050"/>
                 </a:solidFill>
               </a:rPr>
-              <a:t>May 31, 2000.</a:t>
+              <a:t>.</a:t>
             </a:r>
             <a:endParaRPr lang="fr-FR" sz="2400" dirty="0">
               <a:solidFill>
-                <a:srgbClr val="C00000"/>
+                <a:srgbClr val="00B050"/>
               </a:solidFill>
             </a:endParaRPr>
-          </a:p>
-        </p:txBody>
-      </p:sp>
-      <p:sp>
-        <p:nvSpPr>
-          <p:cNvPr id="27" name="Rectangle 26">
-            <a:extLst>
-              <a:ext uri="{FF2B5EF4-FFF2-40B4-BE49-F238E27FC236}">
-                <a16:creationId xmlns:a16="http://schemas.microsoft.com/office/drawing/2014/main" id="{55AF433C-DC33-4EB5-B976-34F524A11185}"/>
-              </a:ext>
-            </a:extLst>
-          </p:cNvPr>
-          <p:cNvSpPr/>
-          <p:nvPr/>
-        </p:nvSpPr>
-        <p:spPr>
-          <a:xfrm>
-            <a:off x="1029438" y="4791647"/>
-            <a:ext cx="206477" cy="206477"/>
-          </a:xfrm>
-          <a:prstGeom prst="rect">
-            <a:avLst/>
-          </a:prstGeom>
-          <a:noFill/>
-          <a:ln>
-            <a:solidFill>
-              <a:srgbClr val="C00000"/>
-            </a:solidFill>
-          </a:ln>
-        </p:spPr>
-        <p:style>
-          <a:lnRef idx="2">
-            <a:schemeClr val="accent1">
-              <a:shade val="50000"/>
-            </a:schemeClr>
-          </a:lnRef>
-          <a:fillRef idx="1">
-            <a:schemeClr val="accent1"/>
-          </a:fillRef>
-          <a:effectRef idx="0">
-            <a:schemeClr val="accent1"/>
-          </a:effectRef>
-          <a:fontRef idx="minor">
-            <a:schemeClr val="lt1"/>
-          </a:fontRef>
-        </p:style>
-        <p:txBody>
-          <a:bodyPr rtlCol="0" anchor="ctr"/>
-          <a:lstStyle/>
-          <a:p>
-            <a:pPr algn="ctr"/>
-            <a:endParaRPr lang="fr-FR">
-              <a:solidFill>
-                <a:srgbClr val="C00000"/>
-              </a:solidFill>
-            </a:endParaRPr>
-          </a:p>
-        </p:txBody>
-      </p:sp>
-      <p:sp>
-        <p:nvSpPr>
-          <p:cNvPr id="28" name="ZoneTexte 27">
-            <a:extLst>
-              <a:ext uri="{FF2B5EF4-FFF2-40B4-BE49-F238E27FC236}">
-                <a16:creationId xmlns:a16="http://schemas.microsoft.com/office/drawing/2014/main" id="{2A62BDB0-3780-47F7-BDBF-3305427157EF}"/>
-              </a:ext>
-            </a:extLst>
-          </p:cNvPr>
-          <p:cNvSpPr txBox="1"/>
-          <p:nvPr/>
-        </p:nvSpPr>
-        <p:spPr>
-          <a:xfrm>
-            <a:off x="1235915" y="4660569"/>
-            <a:ext cx="2660921" cy="461665"/>
-          </a:xfrm>
-          <a:prstGeom prst="rect">
-            <a:avLst/>
-          </a:prstGeom>
-          <a:noFill/>
-        </p:spPr>
-        <p:txBody>
-          <a:bodyPr wrap="none" rtlCol="0">
-            <a:spAutoFit/>
-          </a:bodyPr>
-          <a:lstStyle/>
-          <a:p>
-            <a:r>
-              <a:rPr lang="fr-FR" sz="2400" dirty="0" err="1">
-                <a:solidFill>
-                  <a:srgbClr val="C00000"/>
-                </a:solidFill>
-              </a:rPr>
-              <a:t>December</a:t>
-            </a:r>
-            <a:r>
-              <a:rPr lang="fr-FR" sz="2400" dirty="0">
-                <a:solidFill>
-                  <a:srgbClr val="C00000"/>
-                </a:solidFill>
-              </a:rPr>
-              <a:t> 25, 2004.</a:t>
-            </a:r>
           </a:p>
         </p:txBody>
       </p:sp>
@@ -11195,7 +10605,7 @@
         </p:blipFill>
         <p:spPr>
           <a:xfrm>
-            <a:off x="963337" y="3123347"/>
+            <a:off x="963337" y="3917688"/>
             <a:ext cx="341842" cy="341842"/>
           </a:xfrm>
           <a:prstGeom prst="rect">
@@ -11267,43 +10677,7 @@
         </p:blipFill>
         <p:spPr>
           <a:xfrm>
-            <a:off x="1029437" y="4005206"/>
-            <a:ext cx="206477" cy="206477"/>
-          </a:xfrm>
-          <a:prstGeom prst="rect">
-            <a:avLst/>
-          </a:prstGeom>
-        </p:spPr>
-      </p:pic>
-      <p:pic>
-        <p:nvPicPr>
-          <p:cNvPr id="34" name="Image 33">
-            <a:extLst>
-              <a:ext uri="{FF2B5EF4-FFF2-40B4-BE49-F238E27FC236}">
-                <a16:creationId xmlns:a16="http://schemas.microsoft.com/office/drawing/2014/main" id="{81E0F01F-E4CD-4F6B-9E0B-625B085EFC86}"/>
-              </a:ext>
-            </a:extLst>
-          </p:cNvPr>
-          <p:cNvPicPr>
-            <a:picLocks noChangeAspect="1"/>
-          </p:cNvPicPr>
-          <p:nvPr/>
-        </p:nvPicPr>
-        <p:blipFill>
-          <a:blip r:embed="rId3">
-            <a:extLst>
-              <a:ext uri="{28A0092B-C50C-407E-A947-70E740481C1C}">
-                <a14:useLocalDpi xmlns:a14="http://schemas.microsoft.com/office/drawing/2010/main" val="0"/>
-              </a:ext>
-            </a:extLst>
-          </a:blip>
-          <a:stretch>
-            <a:fillRect/>
-          </a:stretch>
-        </p:blipFill>
-        <p:spPr>
-          <a:xfrm>
-            <a:off x="1029437" y="4796277"/>
+            <a:off x="1029437" y="3206516"/>
             <a:ext cx="206477" cy="206477"/>
           </a:xfrm>
           <a:prstGeom prst="rect">
@@ -11333,6 +10707,9 @@
                     <p:cTn id="3" fill="hold">
                       <p:stCondLst>
                         <p:cond delay="indefinite"/>
+                        <p:cond evt="onBegin" delay="0">
+                          <p:tn val="2"/>
+                        </p:cond>
                       </p:stCondLst>
                       <p:childTnLst>
                         <p:par>
@@ -11342,7 +10719,7 @@
                             </p:stCondLst>
                             <p:childTnLst>
                               <p:par>
-                                <p:cTn id="5" presetID="1" presetClass="entr" presetSubtype="0" fill="hold" grpId="0" nodeType="clickEffect">
+                                <p:cTn id="5" presetID="1" presetClass="entr" presetSubtype="0" fill="hold" grpId="0" nodeType="withEffect">
                                   <p:stCondLst>
                                     <p:cond delay="0"/>
                                   </p:stCondLst>
@@ -11355,7 +10732,7 @@
                                           </p:stCondLst>
                                         </p:cTn>
                                         <p:tgtEl>
-                                          <p:spTgt spid="28"/>
+                                          <p:spTgt spid="25"/>
                                         </p:tgtEl>
                                         <p:attrNameLst>
                                           <p:attrName>style.visibility</p:attrName>
@@ -11382,7 +10759,7 @@
                                           </p:stCondLst>
                                         </p:cTn>
                                         <p:tgtEl>
-                                          <p:spTgt spid="27"/>
+                                          <p:spTgt spid="26"/>
                                         </p:tgtEl>
                                         <p:attrNameLst>
                                           <p:attrName>style.visibility</p:attrName>
@@ -11409,7 +10786,7 @@
                                           </p:stCondLst>
                                         </p:cTn>
                                         <p:tgtEl>
-                                          <p:spTgt spid="25"/>
+                                          <p:spTgt spid="23"/>
                                         </p:tgtEl>
                                         <p:attrNameLst>
                                           <p:attrName>style.visibility</p:attrName>
@@ -11436,7 +10813,7 @@
                                           </p:stCondLst>
                                         </p:cTn>
                                         <p:tgtEl>
-                                          <p:spTgt spid="26"/>
+                                          <p:spTgt spid="24"/>
                                         </p:tgtEl>
                                         <p:attrNameLst>
                                           <p:attrName>style.visibility</p:attrName>
@@ -11463,7 +10840,7 @@
                                           </p:stCondLst>
                                         </p:cTn>
                                         <p:tgtEl>
-                                          <p:spTgt spid="23"/>
+                                          <p:spTgt spid="22"/>
                                         </p:tgtEl>
                                         <p:attrNameLst>
                                           <p:attrName>style.visibility</p:attrName>
@@ -11490,7 +10867,7 @@
                                           </p:stCondLst>
                                         </p:cTn>
                                         <p:tgtEl>
-                                          <p:spTgt spid="24"/>
+                                          <p:spTgt spid="21"/>
                                         </p:tgtEl>
                                         <p:attrNameLst>
                                           <p:attrName>style.visibility</p:attrName>
@@ -11504,7 +10881,7 @@
                                 </p:cTn>
                               </p:par>
                               <p:par>
-                                <p:cTn id="17" presetID="1" presetClass="entr" presetSubtype="0" fill="hold" grpId="0" nodeType="withEffect">
+                                <p:cTn id="17" presetID="1" presetClass="entr" presetSubtype="0" fill="hold" nodeType="withEffect">
                                   <p:stCondLst>
                                     <p:cond delay="0"/>
                                   </p:stCondLst>
@@ -11517,7 +10894,7 @@
                                           </p:stCondLst>
                                         </p:cTn>
                                         <p:tgtEl>
-                                          <p:spTgt spid="22"/>
+                                          <p:spTgt spid="30"/>
                                         </p:tgtEl>
                                         <p:attrNameLst>
                                           <p:attrName>style.visibility</p:attrName>
@@ -11531,7 +10908,7 @@
                                 </p:cTn>
                               </p:par>
                               <p:par>
-                                <p:cTn id="19" presetID="1" presetClass="entr" presetSubtype="0" fill="hold" grpId="0" nodeType="withEffect">
+                                <p:cTn id="19" presetID="1" presetClass="entr" presetSubtype="0" fill="hold" nodeType="withEffect">
                                   <p:stCondLst>
                                     <p:cond delay="0"/>
                                   </p:stCondLst>
@@ -11544,7 +10921,7 @@
                                           </p:stCondLst>
                                         </p:cTn>
                                         <p:tgtEl>
-                                          <p:spTgt spid="21"/>
+                                          <p:spTgt spid="32"/>
                                         </p:tgtEl>
                                         <p:attrNameLst>
                                           <p:attrName>style.visibility</p:attrName>
@@ -11571,88 +10948,7 @@
                                           </p:stCondLst>
                                         </p:cTn>
                                         <p:tgtEl>
-                                          <p:spTgt spid="30"/>
-                                        </p:tgtEl>
-                                        <p:attrNameLst>
-                                          <p:attrName>style.visibility</p:attrName>
-                                        </p:attrNameLst>
-                                      </p:cBhvr>
-                                      <p:to>
-                                        <p:strVal val="visible"/>
-                                      </p:to>
-                                    </p:set>
-                                  </p:childTnLst>
-                                </p:cTn>
-                              </p:par>
-                              <p:par>
-                                <p:cTn id="23" presetID="1" presetClass="entr" presetSubtype="0" fill="hold" nodeType="withEffect">
-                                  <p:stCondLst>
-                                    <p:cond delay="0"/>
-                                  </p:stCondLst>
-                                  <p:childTnLst>
-                                    <p:set>
-                                      <p:cBhvr>
-                                        <p:cTn id="24" dur="1" fill="hold">
-                                          <p:stCondLst>
-                                            <p:cond delay="0"/>
-                                          </p:stCondLst>
-                                        </p:cTn>
-                                        <p:tgtEl>
-                                          <p:spTgt spid="32"/>
-                                        </p:tgtEl>
-                                        <p:attrNameLst>
-                                          <p:attrName>style.visibility</p:attrName>
-                                        </p:attrNameLst>
-                                      </p:cBhvr>
-                                      <p:to>
-                                        <p:strVal val="visible"/>
-                                      </p:to>
-                                    </p:set>
-                                  </p:childTnLst>
-                                </p:cTn>
-                              </p:par>
-                              <p:par>
-                                <p:cTn id="25" presetID="1" presetClass="entr" presetSubtype="0" fill="hold" nodeType="withEffect">
-                                  <p:stCondLst>
-                                    <p:cond delay="0"/>
-                                  </p:stCondLst>
-                                  <p:childTnLst>
-                                    <p:set>
-                                      <p:cBhvr>
-                                        <p:cTn id="26" dur="1" fill="hold">
-                                          <p:stCondLst>
-                                            <p:cond delay="0"/>
-                                          </p:stCondLst>
-                                        </p:cTn>
-                                        <p:tgtEl>
                                           <p:spTgt spid="33"/>
-                                        </p:tgtEl>
-                                        <p:attrNameLst>
-                                          <p:attrName>style.visibility</p:attrName>
-                                        </p:attrNameLst>
-                                      </p:cBhvr>
-                                      <p:to>
-                                        <p:strVal val="visible"/>
-                                      </p:to>
-                                    </p:set>
-                                  </p:childTnLst>
-                                </p:cTn>
-                              </p:par>
-                              <p:par>
-                                <p:cTn id="27" presetID="1" presetClass="entr" presetSubtype="0" fill="hold" nodeType="withEffect">
-                                  <p:stCondLst>
-                                    <p:cond delay="0"/>
-                                  </p:stCondLst>
-                                  <p:childTnLst>
-                                    <p:set>
-                                      <p:cBhvr>
-                                        <p:cTn id="28" dur="1" fill="hold">
-                                          <p:stCondLst>
-                                            <p:cond delay="0"/>
-                                          </p:stCondLst>
-                                        </p:cTn>
-                                        <p:tgtEl>
-                                          <p:spTgt spid="34"/>
                                         </p:tgtEl>
                                         <p:attrNameLst>
                                           <p:attrName>style.visibility</p:attrName>
@@ -11699,8 +10995,6 @@
       <p:bldP spid="24" grpId="0"/>
       <p:bldP spid="25" grpId="0" animBg="1"/>
       <p:bldP spid="26" grpId="0"/>
-      <p:bldP spid="27" grpId="0" animBg="1"/>
-      <p:bldP spid="28" grpId="0"/>
     </p:bldLst>
   </p:timing>
 </p:sld>
@@ -12093,93 +11387,6 @@
               <a:t>At 12 years old.</a:t>
             </a:r>
             <a:endParaRPr lang="fr-FR" sz="2400" dirty="0"/>
-          </a:p>
-        </p:txBody>
-      </p:sp>
-      <p:sp>
-        <p:nvSpPr>
-          <p:cNvPr id="18" name="Rectangle 17">
-            <a:extLst>
-              <a:ext uri="{FF2B5EF4-FFF2-40B4-BE49-F238E27FC236}">
-                <a16:creationId xmlns:a16="http://schemas.microsoft.com/office/drawing/2014/main" id="{D3F822DB-C455-446B-A95E-CF6CD08F1A5F}"/>
-              </a:ext>
-            </a:extLst>
-          </p:cNvPr>
-          <p:cNvSpPr/>
-          <p:nvPr/>
-        </p:nvSpPr>
-        <p:spPr>
-          <a:xfrm>
-            <a:off x="1029438" y="4791647"/>
-            <a:ext cx="206477" cy="206477"/>
-          </a:xfrm>
-          <a:prstGeom prst="rect">
-            <a:avLst/>
-          </a:prstGeom>
-          <a:noFill/>
-          <a:ln>
-            <a:solidFill>
-              <a:schemeClr val="tx1"/>
-            </a:solidFill>
-          </a:ln>
-        </p:spPr>
-        <p:style>
-          <a:lnRef idx="2">
-            <a:schemeClr val="accent1">
-              <a:shade val="50000"/>
-            </a:schemeClr>
-          </a:lnRef>
-          <a:fillRef idx="1">
-            <a:schemeClr val="accent1"/>
-          </a:fillRef>
-          <a:effectRef idx="0">
-            <a:schemeClr val="accent1"/>
-          </a:effectRef>
-          <a:fontRef idx="minor">
-            <a:schemeClr val="lt1"/>
-          </a:fontRef>
-        </p:style>
-        <p:txBody>
-          <a:bodyPr rtlCol="0" anchor="ctr"/>
-          <a:lstStyle/>
-          <a:p>
-            <a:pPr algn="ctr"/>
-            <a:endParaRPr lang="fr-FR"/>
-          </a:p>
-        </p:txBody>
-      </p:sp>
-      <p:sp>
-        <p:nvSpPr>
-          <p:cNvPr id="19" name="ZoneTexte 18">
-            <a:extLst>
-              <a:ext uri="{FF2B5EF4-FFF2-40B4-BE49-F238E27FC236}">
-                <a16:creationId xmlns:a16="http://schemas.microsoft.com/office/drawing/2014/main" id="{CABC40F8-8BA3-4E41-A390-55DD9F80379B}"/>
-              </a:ext>
-            </a:extLst>
-          </p:cNvPr>
-          <p:cNvSpPr txBox="1"/>
-          <p:nvPr/>
-        </p:nvSpPr>
-        <p:spPr>
-          <a:xfrm>
-            <a:off x="1235915" y="4660569"/>
-            <a:ext cx="4722768" cy="461665"/>
-          </a:xfrm>
-          <a:prstGeom prst="rect">
-            <a:avLst/>
-          </a:prstGeom>
-          <a:noFill/>
-        </p:spPr>
-        <p:txBody>
-          <a:bodyPr wrap="none" rtlCol="0">
-            <a:spAutoFit/>
-          </a:bodyPr>
-          <a:lstStyle/>
-          <a:p>
-            <a:r>
-              <a:rPr lang="en-US" sz="2400" dirty="0"/>
-              <a:t>When he started to created Facebook</a:t>
-            </a:r>
           </a:p>
         </p:txBody>
       </p:sp>
@@ -12611,101 +11818,6 @@
           </a:p>
         </p:txBody>
       </p:sp>
-      <p:sp>
-        <p:nvSpPr>
-          <p:cNvPr id="27" name="Rectangle 26">
-            <a:extLst>
-              <a:ext uri="{FF2B5EF4-FFF2-40B4-BE49-F238E27FC236}">
-                <a16:creationId xmlns:a16="http://schemas.microsoft.com/office/drawing/2014/main" id="{55AF433C-DC33-4EB5-B976-34F524A11185}"/>
-              </a:ext>
-            </a:extLst>
-          </p:cNvPr>
-          <p:cNvSpPr/>
-          <p:nvPr/>
-        </p:nvSpPr>
-        <p:spPr>
-          <a:xfrm>
-            <a:off x="1029438" y="4791647"/>
-            <a:ext cx="206477" cy="206477"/>
-          </a:xfrm>
-          <a:prstGeom prst="rect">
-            <a:avLst/>
-          </a:prstGeom>
-          <a:noFill/>
-          <a:ln>
-            <a:solidFill>
-              <a:srgbClr val="C00000"/>
-            </a:solidFill>
-          </a:ln>
-        </p:spPr>
-        <p:style>
-          <a:lnRef idx="2">
-            <a:schemeClr val="accent1">
-              <a:shade val="50000"/>
-            </a:schemeClr>
-          </a:lnRef>
-          <a:fillRef idx="1">
-            <a:schemeClr val="accent1"/>
-          </a:fillRef>
-          <a:effectRef idx="0">
-            <a:schemeClr val="accent1"/>
-          </a:effectRef>
-          <a:fontRef idx="minor">
-            <a:schemeClr val="lt1"/>
-          </a:fontRef>
-        </p:style>
-        <p:txBody>
-          <a:bodyPr rtlCol="0" anchor="ctr"/>
-          <a:lstStyle/>
-          <a:p>
-            <a:pPr algn="ctr"/>
-            <a:endParaRPr lang="fr-FR">
-              <a:solidFill>
-                <a:srgbClr val="C00000"/>
-              </a:solidFill>
-            </a:endParaRPr>
-          </a:p>
-        </p:txBody>
-      </p:sp>
-      <p:sp>
-        <p:nvSpPr>
-          <p:cNvPr id="28" name="ZoneTexte 27">
-            <a:extLst>
-              <a:ext uri="{FF2B5EF4-FFF2-40B4-BE49-F238E27FC236}">
-                <a16:creationId xmlns:a16="http://schemas.microsoft.com/office/drawing/2014/main" id="{2A62BDB0-3780-47F7-BDBF-3305427157EF}"/>
-              </a:ext>
-            </a:extLst>
-          </p:cNvPr>
-          <p:cNvSpPr txBox="1"/>
-          <p:nvPr/>
-        </p:nvSpPr>
-        <p:spPr>
-          <a:xfrm>
-            <a:off x="1235915" y="4660568"/>
-            <a:ext cx="4722768" cy="461665"/>
-          </a:xfrm>
-          <a:prstGeom prst="rect">
-            <a:avLst/>
-          </a:prstGeom>
-          <a:noFill/>
-        </p:spPr>
-        <p:txBody>
-          <a:bodyPr wrap="none" rtlCol="0">
-            <a:spAutoFit/>
-          </a:bodyPr>
-          <a:lstStyle/>
-          <a:p>
-            <a:r>
-              <a:rPr lang="en-US" sz="2400" dirty="0">
-                <a:solidFill>
-                  <a:srgbClr val="C00000"/>
-                </a:solidFill>
-              </a:rPr>
-              <a:t>When he started to created Facebook</a:t>
-            </a:r>
-          </a:p>
-        </p:txBody>
-      </p:sp>
       <p:pic>
         <p:nvPicPr>
           <p:cNvPr id="30" name="Image 29">
@@ -12814,42 +11926,6 @@
           </a:prstGeom>
         </p:spPr>
       </p:pic>
-      <p:pic>
-        <p:nvPicPr>
-          <p:cNvPr id="34" name="Image 33">
-            <a:extLst>
-              <a:ext uri="{FF2B5EF4-FFF2-40B4-BE49-F238E27FC236}">
-                <a16:creationId xmlns:a16="http://schemas.microsoft.com/office/drawing/2014/main" id="{81E0F01F-E4CD-4F6B-9E0B-625B085EFC86}"/>
-              </a:ext>
-            </a:extLst>
-          </p:cNvPr>
-          <p:cNvPicPr>
-            <a:picLocks noChangeAspect="1"/>
-          </p:cNvPicPr>
-          <p:nvPr/>
-        </p:nvPicPr>
-        <p:blipFill>
-          <a:blip r:embed="rId3">
-            <a:extLst>
-              <a:ext uri="{28A0092B-C50C-407E-A947-70E740481C1C}">
-                <a14:useLocalDpi xmlns:a14="http://schemas.microsoft.com/office/drawing/2010/main" val="0"/>
-              </a:ext>
-            </a:extLst>
-          </a:blip>
-          <a:stretch>
-            <a:fillRect/>
-          </a:stretch>
-        </p:blipFill>
-        <p:spPr>
-          <a:xfrm>
-            <a:off x="1029437" y="4796277"/>
-            <a:ext cx="206477" cy="206477"/>
-          </a:xfrm>
-          <a:prstGeom prst="rect">
-            <a:avLst/>
-          </a:prstGeom>
-        </p:spPr>
-      </p:pic>
     </p:spTree>
     <p:extLst>
       <p:ext uri="{BB962C8B-B14F-4D97-AF65-F5344CB8AC3E}">
@@ -12872,6 +11948,9 @@
                     <p:cTn id="3" fill="hold">
                       <p:stCondLst>
                         <p:cond delay="indefinite"/>
+                        <p:cond evt="onBegin" delay="0">
+                          <p:tn val="2"/>
+                        </p:cond>
                       </p:stCondLst>
                       <p:childTnLst>
                         <p:par>
@@ -12881,7 +11960,7 @@
                             </p:stCondLst>
                             <p:childTnLst>
                               <p:par>
-                                <p:cTn id="5" presetID="1" presetClass="entr" presetSubtype="0" fill="hold" grpId="0" nodeType="clickEffect">
+                                <p:cTn id="5" presetID="1" presetClass="entr" presetSubtype="0" fill="hold" grpId="0" nodeType="withEffect">
                                   <p:stCondLst>
                                     <p:cond delay="0"/>
                                   </p:stCondLst>
@@ -12894,7 +11973,7 @@
                                           </p:stCondLst>
                                         </p:cTn>
                                         <p:tgtEl>
-                                          <p:spTgt spid="28"/>
+                                          <p:spTgt spid="25"/>
                                         </p:tgtEl>
                                         <p:attrNameLst>
                                           <p:attrName>style.visibility</p:attrName>
@@ -12921,7 +12000,7 @@
                                           </p:stCondLst>
                                         </p:cTn>
                                         <p:tgtEl>
-                                          <p:spTgt spid="27"/>
+                                          <p:spTgt spid="26"/>
                                         </p:tgtEl>
                                         <p:attrNameLst>
                                           <p:attrName>style.visibility</p:attrName>
@@ -12948,7 +12027,7 @@
                                           </p:stCondLst>
                                         </p:cTn>
                                         <p:tgtEl>
-                                          <p:spTgt spid="25"/>
+                                          <p:spTgt spid="23"/>
                                         </p:tgtEl>
                                         <p:attrNameLst>
                                           <p:attrName>style.visibility</p:attrName>
@@ -12975,7 +12054,7 @@
                                           </p:stCondLst>
                                         </p:cTn>
                                         <p:tgtEl>
-                                          <p:spTgt spid="26"/>
+                                          <p:spTgt spid="24"/>
                                         </p:tgtEl>
                                         <p:attrNameLst>
                                           <p:attrName>style.visibility</p:attrName>
@@ -13002,7 +12081,7 @@
                                           </p:stCondLst>
                                         </p:cTn>
                                         <p:tgtEl>
-                                          <p:spTgt spid="23"/>
+                                          <p:spTgt spid="22"/>
                                         </p:tgtEl>
                                         <p:attrNameLst>
                                           <p:attrName>style.visibility</p:attrName>
@@ -13029,7 +12108,7 @@
                                           </p:stCondLst>
                                         </p:cTn>
                                         <p:tgtEl>
-                                          <p:spTgt spid="24"/>
+                                          <p:spTgt spid="21"/>
                                         </p:tgtEl>
                                         <p:attrNameLst>
                                           <p:attrName>style.visibility</p:attrName>
@@ -13043,7 +12122,7 @@
                                 </p:cTn>
                               </p:par>
                               <p:par>
-                                <p:cTn id="17" presetID="1" presetClass="entr" presetSubtype="0" fill="hold" grpId="0" nodeType="withEffect">
+                                <p:cTn id="17" presetID="1" presetClass="entr" presetSubtype="0" fill="hold" nodeType="withEffect">
                                   <p:stCondLst>
                                     <p:cond delay="0"/>
                                   </p:stCondLst>
@@ -13056,7 +12135,7 @@
                                           </p:stCondLst>
                                         </p:cTn>
                                         <p:tgtEl>
-                                          <p:spTgt spid="22"/>
+                                          <p:spTgt spid="30"/>
                                         </p:tgtEl>
                                         <p:attrNameLst>
                                           <p:attrName>style.visibility</p:attrName>
@@ -13070,7 +12149,7 @@
                                 </p:cTn>
                               </p:par>
                               <p:par>
-                                <p:cTn id="19" presetID="1" presetClass="entr" presetSubtype="0" fill="hold" grpId="0" nodeType="withEffect">
+                                <p:cTn id="19" presetID="1" presetClass="entr" presetSubtype="0" fill="hold" nodeType="withEffect">
                                   <p:stCondLst>
                                     <p:cond delay="0"/>
                                   </p:stCondLst>
@@ -13083,7 +12162,7 @@
                                           </p:stCondLst>
                                         </p:cTn>
                                         <p:tgtEl>
-                                          <p:spTgt spid="21"/>
+                                          <p:spTgt spid="32"/>
                                         </p:tgtEl>
                                         <p:attrNameLst>
                                           <p:attrName>style.visibility</p:attrName>
@@ -13110,88 +12189,7 @@
                                           </p:stCondLst>
                                         </p:cTn>
                                         <p:tgtEl>
-                                          <p:spTgt spid="30"/>
-                                        </p:tgtEl>
-                                        <p:attrNameLst>
-                                          <p:attrName>style.visibility</p:attrName>
-                                        </p:attrNameLst>
-                                      </p:cBhvr>
-                                      <p:to>
-                                        <p:strVal val="visible"/>
-                                      </p:to>
-                                    </p:set>
-                                  </p:childTnLst>
-                                </p:cTn>
-                              </p:par>
-                              <p:par>
-                                <p:cTn id="23" presetID="1" presetClass="entr" presetSubtype="0" fill="hold" nodeType="withEffect">
-                                  <p:stCondLst>
-                                    <p:cond delay="0"/>
-                                  </p:stCondLst>
-                                  <p:childTnLst>
-                                    <p:set>
-                                      <p:cBhvr>
-                                        <p:cTn id="24" dur="1" fill="hold">
-                                          <p:stCondLst>
-                                            <p:cond delay="0"/>
-                                          </p:stCondLst>
-                                        </p:cTn>
-                                        <p:tgtEl>
-                                          <p:spTgt spid="32"/>
-                                        </p:tgtEl>
-                                        <p:attrNameLst>
-                                          <p:attrName>style.visibility</p:attrName>
-                                        </p:attrNameLst>
-                                      </p:cBhvr>
-                                      <p:to>
-                                        <p:strVal val="visible"/>
-                                      </p:to>
-                                    </p:set>
-                                  </p:childTnLst>
-                                </p:cTn>
-                              </p:par>
-                              <p:par>
-                                <p:cTn id="25" presetID="1" presetClass="entr" presetSubtype="0" fill="hold" nodeType="withEffect">
-                                  <p:stCondLst>
-                                    <p:cond delay="0"/>
-                                  </p:stCondLst>
-                                  <p:childTnLst>
-                                    <p:set>
-                                      <p:cBhvr>
-                                        <p:cTn id="26" dur="1" fill="hold">
-                                          <p:stCondLst>
-                                            <p:cond delay="0"/>
-                                          </p:stCondLst>
-                                        </p:cTn>
-                                        <p:tgtEl>
                                           <p:spTgt spid="33"/>
-                                        </p:tgtEl>
-                                        <p:attrNameLst>
-                                          <p:attrName>style.visibility</p:attrName>
-                                        </p:attrNameLst>
-                                      </p:cBhvr>
-                                      <p:to>
-                                        <p:strVal val="visible"/>
-                                      </p:to>
-                                    </p:set>
-                                  </p:childTnLst>
-                                </p:cTn>
-                              </p:par>
-                              <p:par>
-                                <p:cTn id="27" presetID="1" presetClass="entr" presetSubtype="0" fill="hold" nodeType="withEffect">
-                                  <p:stCondLst>
-                                    <p:cond delay="0"/>
-                                  </p:stCondLst>
-                                  <p:childTnLst>
-                                    <p:set>
-                                      <p:cBhvr>
-                                        <p:cTn id="28" dur="1" fill="hold">
-                                          <p:stCondLst>
-                                            <p:cond delay="0"/>
-                                          </p:stCondLst>
-                                        </p:cTn>
-                                        <p:tgtEl>
-                                          <p:spTgt spid="34"/>
                                         </p:tgtEl>
                                         <p:attrNameLst>
                                           <p:attrName>style.visibility</p:attrName>
@@ -13238,8 +12236,6 @@
       <p:bldP spid="24" grpId="0"/>
       <p:bldP spid="25" grpId="0" animBg="1"/>
       <p:bldP spid="26" grpId="0"/>
-      <p:bldP spid="27" grpId="0" animBg="1"/>
-      <p:bldP spid="28" grpId="0"/>
     </p:bldLst>
   </p:timing>
 </p:sld>

</xml_diff>